<commit_message>
adding pdf for presentation 6
</commit_message>
<xml_diff>
--- a/presentations/powerpoints/6_working_with_strings.pptx
+++ b/presentations/powerpoints/6_working_with_strings.pptx
@@ -20,7 +20,7 @@
     <p:sldId id="298" r:id="rId11"/>
     <p:sldId id="299" r:id="rId12"/>
     <p:sldId id="301" r:id="rId13"/>
-    <p:sldId id="300" r:id="rId14"/>
+    <p:sldId id="302" r:id="rId14"/>
     <p:sldId id="266" r:id="rId15"/>
   </p:sldIdLst>
   <p:sldSz cx="18288000" cy="10287000"/>
@@ -1269,7 +1269,7 @@
     </p:spTree>
     <p:extLst>
       <p:ext uri="{BB962C8B-B14F-4D97-AF65-F5344CB8AC3E}">
-        <p14:creationId xmlns:p14="http://schemas.microsoft.com/office/powerpoint/2010/main" val="1131296397"/>
+        <p14:creationId xmlns:p14="http://schemas.microsoft.com/office/powerpoint/2010/main" val="1965550038"/>
       </p:ext>
     </p:extLst>
   </p:cSld>
@@ -9631,22 +9631,9 @@
           </a:bodyPr>
           <a:lstStyle/>
           <a:p>
-            <a:pPr marL="0" lvl="0" indent="0" algn="l" rtl="0">
-              <a:spcBef>
-                <a:spcPts val="0"/>
-              </a:spcBef>
-              <a:spcAft>
-                <a:spcPts val="0"/>
-              </a:spcAft>
-              <a:buNone/>
-            </a:pPr>
-            <a:r>
-              <a:rPr lang="en-US" dirty="0">
-                <a:latin typeface="Roboto"/>
-                <a:ea typeface="Roboto"/>
-                <a:cs typeface="Roboto"/>
-                <a:sym typeface="Roboto"/>
-              </a:rPr>
+            <a:pPr lvl="0"/>
+            <a:r>
+              <a:rPr lang="en-US" dirty="0"/>
               <a:t>Working With String Exercises</a:t>
             </a:r>
             <a:endParaRPr dirty="0">
@@ -9654,6 +9641,92 @@
               <a:ea typeface="Roboto"/>
               <a:cs typeface="Roboto"/>
               <a:sym typeface="Roboto"/>
+            </a:endParaRPr>
+          </a:p>
+        </p:txBody>
+      </p:sp>
+      <p:sp>
+        <p:nvSpPr>
+          <p:cNvPr id="71" name="Google Shape;71;p15"/>
+          <p:cNvSpPr txBox="1">
+            <a:spLocks noGrp="1"/>
+          </p:cNvSpPr>
+          <p:nvPr>
+            <p:ph type="body" idx="1"/>
+          </p:nvPr>
+        </p:nvSpPr>
+        <p:spPr>
+          <a:xfrm>
+            <a:off x="0" y="1168582"/>
+            <a:ext cx="17539855" cy="7269900"/>
+          </a:xfrm>
+          <a:prstGeom prst="rect">
+            <a:avLst/>
+          </a:prstGeom>
+        </p:spPr>
+        <p:txBody>
+          <a:bodyPr spcFirstLastPara="1" wrap="square" lIns="185400" tIns="185400" rIns="185400" bIns="185400" anchor="t" anchorCtr="0">
+            <a:noAutofit/>
+          </a:bodyPr>
+          <a:lstStyle/>
+          <a:p>
+            <a:pPr marL="1028700" lvl="1" indent="-571500">
+              <a:spcBef>
+                <a:spcPts val="600"/>
+              </a:spcBef>
+              <a:spcAft>
+                <a:spcPts val="600"/>
+              </a:spcAft>
+              <a:buFontTx/>
+              <a:buChar char="-"/>
+            </a:pPr>
+            <a:r>
+              <a:rPr lang="en-US" dirty="0">
+                <a:solidFill>
+                  <a:schemeClr val="tx2">
+                    <a:lumMod val="50000"/>
+                  </a:schemeClr>
+                </a:solidFill>
+              </a:rPr>
+              <a:t>Use the link below to find some practice exercises that deal with working with strings. </a:t>
+            </a:r>
+          </a:p>
+          <a:p>
+            <a:pPr marL="1028700" lvl="1" indent="-571500">
+              <a:spcBef>
+                <a:spcPts val="600"/>
+              </a:spcBef>
+              <a:spcAft>
+                <a:spcPts val="600"/>
+              </a:spcAft>
+              <a:buFontTx/>
+              <a:buChar char="-"/>
+            </a:pPr>
+            <a:r>
+              <a:rPr lang="en-US" dirty="0">
+                <a:hlinkClick r:id="rId3"/>
+              </a:rPr>
+              <a:t>https://github.com/ProjectFullStack/Learn-To-Program-Python3/blob/master/exercises/working_with_strings.txt</a:t>
+            </a:r>
+            <a:endParaRPr lang="en-US" dirty="0">
+              <a:solidFill>
+                <a:schemeClr val="tx2">
+                  <a:lumMod val="50000"/>
+                </a:schemeClr>
+              </a:solidFill>
+            </a:endParaRPr>
+          </a:p>
+          <a:p>
+            <a:pPr marL="914400" lvl="2" indent="0">
+              <a:spcAft>
+                <a:spcPts val="600"/>
+              </a:spcAft>
+              <a:buNone/>
+            </a:pPr>
+            <a:endParaRPr lang="en-US" dirty="0">
+              <a:solidFill>
+                <a:schemeClr val="accent3"/>
+              </a:solidFill>
             </a:endParaRPr>
           </a:p>
         </p:txBody>
@@ -9797,7 +9870,7 @@
     </p:spTree>
     <p:extLst>
       <p:ext uri="{BB962C8B-B14F-4D97-AF65-F5344CB8AC3E}">
-        <p14:creationId xmlns:p14="http://schemas.microsoft.com/office/powerpoint/2010/main" val="58341875"/>
+        <p14:creationId xmlns:p14="http://schemas.microsoft.com/office/powerpoint/2010/main" val="2618553583"/>
       </p:ext>
     </p:extLst>
   </p:cSld>

</xml_diff>